<commit_message>
minor tweaks and clean up
</commit_message>
<xml_diff>
--- a/IntroToStata.pptx
+++ b/IntroToStata.pptx
@@ -208,7 +208,7 @@
           <a:p>
             <a:fld id="{57C02C18-1C35-B744-804C-83B8B9D674F2}" type="datetimeFigureOut">
               <a:rPr lang="en-US" smtClean="0"/>
-              <a:t>8/29/2014</a:t>
+              <a:t>9/5/2014</a:t>
             </a:fld>
             <a:endParaRPr lang="en-US"/>
           </a:p>
@@ -6923,7 +6923,7 @@
         <p:spPr>
           <a:xfrm>
             <a:off x="457199" y="1842716"/>
-            <a:ext cx="6976035" cy="3693319"/>
+            <a:ext cx="6976035" cy="2862322"/>
           </a:xfrm>
           <a:prstGeom prst="rect">
             <a:avLst/>
@@ -7160,34 +7160,10 @@
               <a:tabLst/>
               <a:defRPr/>
             </a:pPr>
-            <a:endParaRPr lang="en-US" b="0" i="0" dirty="0">
+            <a:endParaRPr lang="en-US" b="0" i="0" dirty="0" smtClean="0">
               <a:latin typeface="Adobe Garamond Pro"/>
               <a:cs typeface="Adobe Garamond Pro"/>
             </a:endParaRPr>
-          </a:p>
-          <a:p>
-            <a:pPr marR="0" algn="l" defTabSz="457200" rtl="0" eaLnBrk="1" fontAlgn="auto" latinLnBrk="0" hangingPunct="1">
-              <a:lnSpc>
-                <a:spcPct val="100000"/>
-              </a:lnSpc>
-              <a:spcBef>
-                <a:spcPts val="0"/>
-              </a:spcBef>
-              <a:spcAft>
-                <a:spcPts val="0"/>
-              </a:spcAft>
-              <a:buClrTx/>
-              <a:buSzTx/>
-              <a:tabLst/>
-              <a:defRPr/>
-            </a:pPr>
-            <a:r>
-              <a:rPr lang="en-US" dirty="0" smtClean="0">
-                <a:latin typeface="Adobe Garamond Pro"/>
-                <a:cs typeface="Adobe Garamond Pro"/>
-              </a:rPr>
-              <a:t>Expectations</a:t>
-            </a:r>
           </a:p>
           <a:p>
             <a:pPr marL="285750" marR="0" indent="-285750" algn="l" defTabSz="457200" rtl="0" eaLnBrk="1" fontAlgn="auto" latinLnBrk="0" hangingPunct="1">
@@ -7207,46 +7183,10 @@
               <a:tabLst/>
               <a:defRPr/>
             </a:pPr>
-            <a:r>
-              <a:rPr lang="en-US" b="0" i="0" dirty="0" smtClean="0">
-                <a:latin typeface="Adobe Garamond Pro"/>
-                <a:cs typeface="Adobe Garamond Pro"/>
-              </a:rPr>
-              <a:t>Manage them. Stata can do many things and </a:t>
-            </a:r>
-            <a:r>
-              <a:rPr lang="en-US" dirty="0" smtClean="0">
-                <a:latin typeface="Adobe Garamond Pro"/>
-                <a:cs typeface="Adobe Garamond Pro"/>
-              </a:rPr>
-              <a:t>thus takes time to learn</a:t>
-            </a:r>
-          </a:p>
-          <a:p>
-            <a:pPr marL="285750" marR="0" indent="-285750" algn="l" defTabSz="457200" rtl="0" eaLnBrk="1" fontAlgn="auto" latinLnBrk="0" hangingPunct="1">
-              <a:lnSpc>
-                <a:spcPct val="100000"/>
-              </a:lnSpc>
-              <a:spcBef>
-                <a:spcPts val="0"/>
-              </a:spcBef>
-              <a:spcAft>
-                <a:spcPts val="0"/>
-              </a:spcAft>
-              <a:buClrTx/>
-              <a:buSzTx/>
-              <a:buFont typeface="Arial" panose="020B0604020202020204" pitchFamily="34" charset="0"/>
-              <a:buChar char="•"/>
-              <a:tabLst/>
-              <a:defRPr/>
-            </a:pPr>
-            <a:r>
-              <a:rPr lang="en-US" b="0" i="0" dirty="0" smtClean="0">
-                <a:latin typeface="Adobe Garamond Pro"/>
-                <a:cs typeface="Adobe Garamond Pro"/>
-              </a:rPr>
-              <a:t>My hope is you’ll be ready to help yourself go further with Stata</a:t>
-            </a:r>
+            <a:endParaRPr lang="en-US" b="0" i="0" dirty="0">
+              <a:latin typeface="Adobe Garamond Pro"/>
+              <a:cs typeface="Adobe Garamond Pro"/>
+            </a:endParaRPr>
           </a:p>
         </p:txBody>
       </p:sp>
@@ -7342,7 +7282,7 @@
         <p:spPr>
           <a:xfrm>
             <a:off x="457199" y="1842716"/>
-            <a:ext cx="6976035" cy="2031325"/>
+            <a:ext cx="6976035" cy="3970318"/>
           </a:xfrm>
           <a:prstGeom prst="rect">
             <a:avLst/>
@@ -7506,7 +7446,96 @@
                 <a:latin typeface="Adobe Garamond Pro"/>
                 <a:cs typeface="Adobe Garamond Pro"/>
               </a:rPr>
-              <a:t>Can purchase perpetual license or annual license</a:t>
+              <a:t>Can purchase perpetual license or annual </a:t>
+            </a:r>
+            <a:r>
+              <a:rPr lang="en-US" dirty="0" smtClean="0">
+                <a:latin typeface="Adobe Garamond Pro"/>
+                <a:cs typeface="Adobe Garamond Pro"/>
+              </a:rPr>
+              <a:t>license</a:t>
+            </a:r>
+          </a:p>
+          <a:p>
+            <a:pPr marL="285750" marR="0" indent="-285750" algn="l" defTabSz="457200" rtl="0" eaLnBrk="1" fontAlgn="auto" latinLnBrk="0" hangingPunct="1">
+              <a:lnSpc>
+                <a:spcPct val="100000"/>
+              </a:lnSpc>
+              <a:spcBef>
+                <a:spcPts val="0"/>
+              </a:spcBef>
+              <a:spcAft>
+                <a:spcPts val="0"/>
+              </a:spcAft>
+              <a:buClrTx/>
+              <a:buSzTx/>
+              <a:buFont typeface="Arial" panose="020B0604020202020204" pitchFamily="34" charset="0"/>
+              <a:buChar char="•"/>
+              <a:tabLst/>
+              <a:defRPr/>
+            </a:pPr>
+            <a:r>
+              <a:rPr lang="en-US" b="0" i="0" dirty="0" smtClean="0">
+                <a:latin typeface="Adobe Garamond Pro"/>
+                <a:cs typeface="Adobe Garamond Pro"/>
+              </a:rPr>
+              <a:t>Can purchase different flavors:</a:t>
+            </a:r>
+          </a:p>
+          <a:p>
+            <a:pPr marL="742950" lvl="1" indent="-285750">
+              <a:buFont typeface="Arial" panose="020B0604020202020204" pitchFamily="34" charset="0"/>
+              <a:buChar char="•"/>
+              <a:defRPr/>
+            </a:pPr>
+            <a:r>
+              <a:rPr lang="en-US" dirty="0">
+                <a:latin typeface="Adobe Garamond Pro"/>
+                <a:cs typeface="Adobe Garamond Pro"/>
+              </a:rPr>
+              <a:t>Stata/MP: The fastest version of Stata (for dual-core and multicore/multiprocessor computers)</a:t>
+            </a:r>
+          </a:p>
+          <a:p>
+            <a:pPr marL="742950" lvl="1" indent="-285750">
+              <a:buFont typeface="Arial" panose="020B0604020202020204" pitchFamily="34" charset="0"/>
+              <a:buChar char="•"/>
+              <a:defRPr/>
+            </a:pPr>
+            <a:r>
+              <a:rPr lang="en-US" dirty="0">
+                <a:latin typeface="Adobe Garamond Pro"/>
+                <a:cs typeface="Adobe Garamond Pro"/>
+              </a:rPr>
+              <a:t>Stata/SE: Stata for large datasets</a:t>
+            </a:r>
+          </a:p>
+          <a:p>
+            <a:pPr marL="742950" lvl="1" indent="-285750">
+              <a:buFont typeface="Arial" panose="020B0604020202020204" pitchFamily="34" charset="0"/>
+              <a:buChar char="•"/>
+              <a:defRPr/>
+            </a:pPr>
+            <a:r>
+              <a:rPr lang="en-US" dirty="0">
+                <a:latin typeface="Adobe Garamond Pro"/>
+                <a:cs typeface="Adobe Garamond Pro"/>
+              </a:rPr>
+              <a:t>Stata/IC: Stata for moderate-sized datasets</a:t>
+            </a:r>
+          </a:p>
+          <a:p>
+            <a:pPr marL="742950" lvl="1" indent="-285750">
+              <a:buFont typeface="Arial" panose="020B0604020202020204" pitchFamily="34" charset="0"/>
+              <a:buChar char="•"/>
+              <a:defRPr/>
+            </a:pPr>
+            <a:r>
+              <a:rPr lang="en-US" dirty="0">
+                <a:latin typeface="Adobe Garamond Pro"/>
+                <a:cs typeface="Adobe Garamond Pro"/>
+              </a:rPr>
+              <a:t>Small Stata: A version of Stata that handles small datasets (for students only)</a:t>
             </a:r>
             <a:endParaRPr lang="en-US" b="0" i="0" dirty="0" smtClean="0">
               <a:latin typeface="Adobe Garamond Pro"/>
@@ -7818,11 +7847,18 @@
               <a:t>Provides access to </a:t>
             </a:r>
             <a:r>
+              <a:rPr lang="en-US" dirty="0" smtClean="0">
+                <a:latin typeface="Adobe Garamond Pro"/>
+                <a:cs typeface="Adobe Garamond Pro"/>
+              </a:rPr>
+              <a:t>Stata/IC, </a:t>
+            </a:r>
+            <a:r>
               <a:rPr lang="en-US" dirty="0">
                 <a:latin typeface="Adobe Garamond Pro"/>
                 <a:cs typeface="Adobe Garamond Pro"/>
               </a:rPr>
-              <a:t>Stata Intercooled, version </a:t>
+              <a:t>version </a:t>
             </a:r>
             <a:r>
               <a:rPr lang="en-US" dirty="0" smtClean="0">
@@ -8341,7 +8377,7 @@
         </p:nvCxnSpPr>
         <p:spPr>
           <a:xfrm flipH="1" flipV="1">
-            <a:off x="6619172" y="4115634"/>
+            <a:off x="6527732" y="4186754"/>
             <a:ext cx="690172" cy="331556"/>
           </a:xfrm>
           <a:prstGeom prst="straightConnector1">
@@ -9098,8 +9134,61 @@
                 <a:latin typeface="Adobe Garamond Pro"/>
                 <a:cs typeface="Adobe Garamond Pro"/>
               </a:rPr>
-              <a:t>” instead of “regress”, “gen” instead of “generate”)</a:t>
-            </a:r>
+              <a:t>” </a:t>
+            </a:r>
+            <a:r>
+              <a:rPr lang="en-US" b="0" i="0" dirty="0" smtClean="0">
+                <a:latin typeface="Adobe Garamond Pro"/>
+                <a:cs typeface="Adobe Garamond Pro"/>
+              </a:rPr>
+              <a:t>for “regress</a:t>
+            </a:r>
+            <a:r>
+              <a:rPr lang="en-US" b="0" i="0" dirty="0" smtClean="0">
+                <a:latin typeface="Adobe Garamond Pro"/>
+                <a:cs typeface="Adobe Garamond Pro"/>
+              </a:rPr>
+              <a:t>”, “gen” </a:t>
+            </a:r>
+            <a:r>
+              <a:rPr lang="en-US" b="0" i="0" dirty="0" smtClean="0">
+                <a:latin typeface="Adobe Garamond Pro"/>
+                <a:cs typeface="Adobe Garamond Pro"/>
+              </a:rPr>
+              <a:t>fo</a:t>
+            </a:r>
+            <a:r>
+              <a:rPr lang="en-US" dirty="0" smtClean="0">
+                <a:latin typeface="Adobe Garamond Pro"/>
+                <a:cs typeface="Adobe Garamond Pro"/>
+              </a:rPr>
+              <a:t>r </a:t>
+            </a:r>
+            <a:r>
+              <a:rPr lang="en-US" b="0" i="0" dirty="0" smtClean="0">
+                <a:latin typeface="Adobe Garamond Pro"/>
+                <a:cs typeface="Adobe Garamond Pro"/>
+              </a:rPr>
+              <a:t>“generate”, “sum” </a:t>
+            </a:r>
+            <a:r>
+              <a:rPr lang="en-US" dirty="0" smtClean="0">
+                <a:latin typeface="Adobe Garamond Pro"/>
+                <a:cs typeface="Adobe Garamond Pro"/>
+              </a:rPr>
+              <a:t>for “summary”</a:t>
+            </a:r>
+            <a:r>
+              <a:rPr lang="en-US" b="0" i="0" dirty="0" smtClean="0">
+                <a:latin typeface="Adobe Garamond Pro"/>
+                <a:cs typeface="Adobe Garamond Pro"/>
+              </a:rPr>
+              <a:t>)</a:t>
+            </a:r>
+            <a:endParaRPr lang="en-US" b="0" i="0" dirty="0" smtClean="0">
+              <a:latin typeface="Adobe Garamond Pro"/>
+              <a:cs typeface="Adobe Garamond Pro"/>
+            </a:endParaRPr>
           </a:p>
           <a:p>
             <a:pPr marL="285750" marR="0" indent="-285750" algn="l" defTabSz="457200" rtl="0" eaLnBrk="1" fontAlgn="auto" latinLnBrk="0" hangingPunct="1">
@@ -9397,7 +9486,21 @@
                 <a:latin typeface="Adobe Garamond Pro"/>
                 <a:cs typeface="Adobe Garamond Pro"/>
               </a:rPr>
-              <a:t> files are essentially a script of Stata commands; today we will work from a do file prepared in advance</a:t>
+              <a:t> </a:t>
+            </a:r>
+            <a:r>
+              <a:rPr lang="en-US" b="0" i="0" dirty="0" smtClean="0">
+                <a:latin typeface="Adobe Garamond Pro"/>
+                <a:cs typeface="Adobe Garamond Pro"/>
+              </a:rPr>
+              <a:t>file: a text file of </a:t>
+            </a:r>
+            <a:r>
+              <a:rPr lang="en-US" b="0" i="0" dirty="0" smtClean="0">
+                <a:latin typeface="Adobe Garamond Pro"/>
+                <a:cs typeface="Adobe Garamond Pro"/>
+              </a:rPr>
+              <a:t>Stata commands; today we will work from a do file prepared in advance</a:t>
             </a:r>
           </a:p>
           <a:p>
@@ -9487,7 +9590,35 @@
                 <a:latin typeface="Adobe Garamond Pro"/>
                 <a:cs typeface="Adobe Garamond Pro"/>
               </a:rPr>
-              <a:t> files are records of results; they capture text printed in the Results window</a:t>
+              <a:t> </a:t>
+            </a:r>
+            <a:r>
+              <a:rPr lang="en-US" dirty="0" smtClean="0">
+                <a:latin typeface="Adobe Garamond Pro"/>
+                <a:cs typeface="Adobe Garamond Pro"/>
+              </a:rPr>
+              <a:t>file: record </a:t>
+            </a:r>
+            <a:r>
+              <a:rPr lang="en-US" dirty="0" smtClean="0">
+                <a:latin typeface="Adobe Garamond Pro"/>
+                <a:cs typeface="Adobe Garamond Pro"/>
+              </a:rPr>
+              <a:t>of results; </a:t>
+            </a:r>
+            <a:r>
+              <a:rPr lang="en-US" dirty="0" smtClean="0">
+                <a:latin typeface="Adobe Garamond Pro"/>
+                <a:cs typeface="Adobe Garamond Pro"/>
+              </a:rPr>
+              <a:t>captures </a:t>
+            </a:r>
+            <a:r>
+              <a:rPr lang="en-US" dirty="0" smtClean="0">
+                <a:latin typeface="Adobe Garamond Pro"/>
+                <a:cs typeface="Adobe Garamond Pro"/>
+              </a:rPr>
+              <a:t>text printed in the Results window</a:t>
             </a:r>
           </a:p>
           <a:p>

</xml_diff>